<commit_message>
Sidebar completed and Request tutor added
</commit_message>
<xml_diff>
--- a/HIDDEN-BRAIN.pptx
+++ b/HIDDEN-BRAIN.pptx
@@ -204,7 +204,7 @@
           <a:p>
             <a:fld id="{AFD01546-198A-4195-BCF8-F0FF54C90E5E}" type="datetimeFigureOut">
               <a:rPr lang="en-US" smtClean="0"/>
-              <a:t>6/24/2022</a:t>
+              <a:t>6/30/2022</a:t>
             </a:fld>
             <a:endParaRPr lang="en-US" dirty="0"/>
           </a:p>
@@ -656,7 +656,7 @@
           <a:p>
             <a:fld id="{88D38747-4367-4BD2-8D51-C97E202738E2}" type="datetime1">
               <a:rPr lang="en-US" smtClean="0"/>
-              <a:t>6/24/2022</a:t>
+              <a:t>6/30/2022</a:t>
             </a:fld>
             <a:endParaRPr lang="en-US" dirty="0"/>
           </a:p>
@@ -960,7 +960,7 @@
           <a:p>
             <a:fld id="{11F1B079-7EF0-44EE-B798-BCC497C9F3B2}" type="datetime1">
               <a:rPr lang="en-US" smtClean="0"/>
-              <a:t>6/24/2022</a:t>
+              <a:t>6/30/2022</a:t>
             </a:fld>
             <a:endParaRPr lang="en-US" dirty="0"/>
           </a:p>
@@ -1154,7 +1154,7 @@
           <a:p>
             <a:fld id="{28FF70A8-1D13-4657-95F0-A9EA54967B8D}" type="datetime1">
               <a:rPr lang="en-US" smtClean="0"/>
-              <a:t>6/24/2022</a:t>
+              <a:t>6/30/2022</a:t>
             </a:fld>
             <a:endParaRPr lang="en-US" dirty="0"/>
           </a:p>
@@ -1417,7 +1417,7 @@
           <a:p>
             <a:fld id="{21EB90AC-71BD-4C7F-8ACA-7B3F18292E63}" type="datetime1">
               <a:rPr lang="en-US" smtClean="0"/>
-              <a:t>6/24/2022</a:t>
+              <a:t>6/30/2022</a:t>
             </a:fld>
             <a:endParaRPr lang="en-US" dirty="0"/>
           </a:p>
@@ -1853,7 +1853,7 @@
           <a:p>
             <a:fld id="{4E6EFC2C-8905-46F0-B443-CE905B76BA01}" type="datetime1">
               <a:rPr lang="en-US" smtClean="0"/>
-              <a:t>6/24/2022</a:t>
+              <a:t>6/30/2022</a:t>
             </a:fld>
             <a:endParaRPr lang="en-US" dirty="0"/>
           </a:p>
@@ -2390,7 +2390,7 @@
           <a:p>
             <a:fld id="{D9079DC3-C9B5-499E-9140-0DC28B7074E2}" type="datetime1">
               <a:rPr lang="en-US" smtClean="0"/>
-              <a:t>6/24/2022</a:t>
+              <a:t>6/30/2022</a:t>
             </a:fld>
             <a:endParaRPr lang="en-US" dirty="0"/>
           </a:p>
@@ -3269,7 +3269,7 @@
           <a:p>
             <a:fld id="{30BB33EA-E472-4D22-9C03-A9C14AA21CED}" type="datetime1">
               <a:rPr lang="en-US" smtClean="0"/>
-              <a:t>6/24/2022</a:t>
+              <a:t>6/30/2022</a:t>
             </a:fld>
             <a:endParaRPr lang="en-US" dirty="0"/>
           </a:p>
@@ -3439,7 +3439,7 @@
           <a:p>
             <a:fld id="{73C55A3C-5767-4844-A0A3-83778C2E5409}" type="datetime1">
               <a:rPr lang="en-US" smtClean="0"/>
-              <a:t>6/24/2022</a:t>
+              <a:t>6/30/2022</a:t>
             </a:fld>
             <a:endParaRPr lang="en-US" dirty="0"/>
           </a:p>
@@ -3683,7 +3683,7 @@
           <a:p>
             <a:fld id="{CAE507A8-A5CF-4D38-AB86-7EDDA87A85D4}" type="datetime1">
               <a:rPr lang="en-US" smtClean="0"/>
-              <a:t>6/24/2022</a:t>
+              <a:t>6/30/2022</a:t>
             </a:fld>
             <a:endParaRPr lang="en-US" dirty="0"/>
           </a:p>
@@ -3925,7 +3925,7 @@
           <a:p>
             <a:fld id="{BDFCD27C-8599-43EF-BA1D-14DDC1946E06}" type="datetime1">
               <a:rPr lang="en-US" smtClean="0"/>
-              <a:t>6/24/2022</a:t>
+              <a:t>6/30/2022</a:t>
             </a:fld>
             <a:endParaRPr lang="en-US" dirty="0"/>
           </a:p>
@@ -4408,7 +4408,7 @@
           <a:p>
             <a:fld id="{49343D99-809A-49C0-96E5-4250D0B498EE}" type="datetime1">
               <a:rPr lang="en-US" smtClean="0"/>
-              <a:t>6/24/2022</a:t>
+              <a:t>6/30/2022</a:t>
             </a:fld>
             <a:endParaRPr lang="en-US" dirty="0"/>
           </a:p>
@@ -4526,7 +4526,7 @@
           <a:p>
             <a:fld id="{A143DE9B-B678-4EFB-BB7D-A4370204A0B0}" type="datetime1">
               <a:rPr lang="en-US" smtClean="0"/>
-              <a:t>6/24/2022</a:t>
+              <a:t>6/30/2022</a:t>
             </a:fld>
             <a:endParaRPr lang="en-US" dirty="0"/>
           </a:p>
@@ -4621,7 +4621,7 @@
           <a:p>
             <a:fld id="{E68812DA-F765-4142-A6A3-A8ED7235E082}" type="datetime1">
               <a:rPr lang="en-US" smtClean="0"/>
-              <a:t>6/24/2022</a:t>
+              <a:t>6/30/2022</a:t>
             </a:fld>
             <a:endParaRPr lang="en-US" dirty="0"/>
           </a:p>
@@ -4876,7 +4876,7 @@
           <a:p>
             <a:fld id="{3E0277FD-7DE6-41D4-930D-AC99F5AFE54E}" type="datetime1">
               <a:rPr lang="en-US" smtClean="0"/>
-              <a:t>6/24/2022</a:t>
+              <a:t>6/30/2022</a:t>
             </a:fld>
             <a:endParaRPr lang="en-US" dirty="0"/>
           </a:p>
@@ -5182,7 +5182,7 @@
           <a:p>
             <a:fld id="{9EA15526-7079-4B7B-987C-1B5FAE11A0FF}" type="datetime1">
               <a:rPr lang="en-US" smtClean="0"/>
-              <a:t>6/24/2022</a:t>
+              <a:t>6/30/2022</a:t>
             </a:fld>
             <a:endParaRPr lang="en-US" dirty="0"/>
           </a:p>
@@ -5417,7 +5417,7 @@
           <a:p>
             <a:fld id="{073ED0CC-082F-4160-86E5-0D6041F12778}" type="datetime1">
               <a:rPr lang="en-US" smtClean="0"/>
-              <a:t>6/24/2022</a:t>
+              <a:t>6/30/2022</a:t>
             </a:fld>
             <a:endParaRPr lang="en-US" dirty="0"/>
           </a:p>
@@ -6375,7 +6375,7 @@
         </p:blipFill>
         <p:spPr>
           <a:xfrm>
-            <a:off x="8646" y="10"/>
+            <a:off x="17272" y="10"/>
             <a:ext cx="12191980" cy="6857990"/>
           </a:xfrm>
           <a:prstGeom prst="rect">
@@ -6844,19 +6844,38 @@
                 <a:ea typeface="Cambria Math" panose="02040503050406030204" pitchFamily="18" charset="0"/>
                 <a:cs typeface="Arial" panose="020B0604020202020204" pitchFamily="34" charset="0"/>
               </a:rPr>
-              <a:t>days_per_week</a:t>
-            </a:r>
-            <a:r>
-              <a:rPr lang="en-US" sz="1500" dirty="0">
-                <a:solidFill>
-                  <a:schemeClr val="bg1"/>
-                </a:solidFill>
-                <a:latin typeface="Cambria Math" panose="02040503050406030204" pitchFamily="18" charset="0"/>
-                <a:ea typeface="Cambria Math" panose="02040503050406030204" pitchFamily="18" charset="0"/>
-                <a:cs typeface="Arial" panose="020B0604020202020204" pitchFamily="34" charset="0"/>
-              </a:rPr>
-              <a:t>)</a:t>
-            </a:r>
+              <a:t>days_per_</a:t>
+            </a:r>
+            <a:r>
+              <a:rPr lang="en-US" sz="1500" err="1">
+                <a:solidFill>
+                  <a:schemeClr val="bg1"/>
+                </a:solidFill>
+                <a:latin typeface="Cambria Math" panose="02040503050406030204" pitchFamily="18" charset="0"/>
+                <a:ea typeface="Cambria Math" panose="02040503050406030204" pitchFamily="18" charset="0"/>
+                <a:cs typeface="Arial" panose="020B0604020202020204" pitchFamily="34" charset="0"/>
+              </a:rPr>
+              <a:t>week</a:t>
+            </a:r>
+            <a:r>
+              <a:rPr lang="en-US" sz="1500">
+                <a:solidFill>
+                  <a:schemeClr val="bg1"/>
+                </a:solidFill>
+                <a:latin typeface="Cambria Math" panose="02040503050406030204" pitchFamily="18" charset="0"/>
+                <a:ea typeface="Cambria Math" panose="02040503050406030204" pitchFamily="18" charset="0"/>
+                <a:cs typeface="Arial" panose="020B0604020202020204" pitchFamily="34" charset="0"/>
+              </a:rPr>
+              <a:t>,type)</a:t>
+            </a:r>
+            <a:endParaRPr lang="en-US" sz="1500" dirty="0">
+              <a:solidFill>
+                <a:schemeClr val="bg1"/>
+              </a:solidFill>
+              <a:latin typeface="Cambria Math" panose="02040503050406030204" pitchFamily="18" charset="0"/>
+              <a:ea typeface="Cambria Math" panose="02040503050406030204" pitchFamily="18" charset="0"/>
+              <a:cs typeface="Arial" panose="020B0604020202020204" pitchFamily="34" charset="0"/>
+            </a:endParaRPr>
           </a:p>
           <a:p>
             <a:pPr marL="742950" lvl="1" indent="-285750">
@@ -9585,6 +9604,24 @@
 </file>
 
 <file path=customXml/item1.xml><?xml version="1.0" encoding="utf-8"?>
+<?mso-contentType ?>
+<FormTemplates xmlns="http://schemas.microsoft.com/sharepoint/v3/contenttype/forms">
+  <Display>DocumentLibraryForm</Display>
+  <Edit>DocumentLibraryForm</Edit>
+  <New>DocumentLibraryForm</New>
+</FormTemplates>
+</file>
+
+<file path=customXml/item2.xml><?xml version="1.0" encoding="utf-8"?>
+<p:properties xmlns:p="http://schemas.microsoft.com/office/2006/metadata/properties" xmlns:xsi="http://www.w3.org/2001/XMLSchema-instance" xmlns:pc="http://schemas.microsoft.com/office/infopath/2007/PartnerControls">
+  <documentManagement>
+    <Status xmlns="71af3243-3dd4-4a8d-8c0d-dd76da1f02a5">Not started</Status>
+    <MediaServiceKeyPoints xmlns="71af3243-3dd4-4a8d-8c0d-dd76da1f02a5" xsi:nil="true"/>
+  </documentManagement>
+</p:properties>
+</file>
+
+<file path=customXml/item3.xml><?xml version="1.0" encoding="utf-8"?>
 <ct:contentTypeSchema xmlns:ct="http://schemas.microsoft.com/office/2006/metadata/contentType" xmlns:ma="http://schemas.microsoft.com/office/2006/metadata/properties/metaAttributes" ct:_="" ma:_="" ma:contentTypeName="Document" ma:contentTypeID="0x01010079F111ED35F8CC479449609E8A0923A6" ma:contentTypeVersion="12" ma:contentTypeDescription="Create a new document." ma:contentTypeScope="" ma:versionID="a410dd7f93c95333ffa1b60ed6adedd1">
   <xsd:schema xmlns:xsd="http://www.w3.org/2001/XMLSchema" xmlns:xs="http://www.w3.org/2001/XMLSchema" xmlns:p="http://schemas.microsoft.com/office/2006/metadata/properties" xmlns:ns2="71af3243-3dd4-4a8d-8c0d-dd76da1f02a5" xmlns:ns3="16c05727-aa75-4e4a-9b5f-8a80a1165891" targetNamespace="http://schemas.microsoft.com/office/2006/metadata/properties" ma:root="true" ma:fieldsID="a936d9baba76aa3866493feff160faab" ns2:_="" ns3:_="">
     <xsd:import namespace="71af3243-3dd4-4a8d-8c0d-dd76da1f02a5"/>
@@ -9805,25 +9842,25 @@
 </ct:contentTypeSchema>
 </file>
 
-<file path=customXml/item2.xml><?xml version="1.0" encoding="utf-8"?>
-<p:properties xmlns:p="http://schemas.microsoft.com/office/2006/metadata/properties" xmlns:xsi="http://www.w3.org/2001/XMLSchema-instance" xmlns:pc="http://schemas.microsoft.com/office/infopath/2007/PartnerControls">
-  <documentManagement>
-    <Status xmlns="71af3243-3dd4-4a8d-8c0d-dd76da1f02a5">Not started</Status>
-    <MediaServiceKeyPoints xmlns="71af3243-3dd4-4a8d-8c0d-dd76da1f02a5" xsi:nil="true"/>
-  </documentManagement>
-</p:properties>
+<file path=customXml/itemProps1.xml><?xml version="1.0" encoding="utf-8"?>
+<ds:datastoreItem xmlns:ds="http://schemas.openxmlformats.org/officeDocument/2006/customXml" ds:itemID="{64B270AB-C138-415C-897E-3C24487DECF1}">
+  <ds:schemaRefs>
+    <ds:schemaRef ds:uri="http://schemas.microsoft.com/sharepoint/v3/contenttype/forms"/>
+  </ds:schemaRefs>
+</ds:datastoreItem>
 </file>
 
-<file path=customXml/item3.xml><?xml version="1.0" encoding="utf-8"?>
-<?mso-contentType ?>
-<FormTemplates xmlns="http://schemas.microsoft.com/sharepoint/v3/contenttype/forms">
-  <Display>DocumentLibraryForm</Display>
-  <Edit>DocumentLibraryForm</Edit>
-  <New>DocumentLibraryForm</New>
-</FormTemplates>
+<file path=customXml/itemProps2.xml><?xml version="1.0" encoding="utf-8"?>
+<ds:datastoreItem xmlns:ds="http://schemas.openxmlformats.org/officeDocument/2006/customXml" ds:itemID="{2C4C00F4-06E9-43E3-AD97-88A857CEFA82}">
+  <ds:schemaRefs>
+    <ds:schemaRef ds:uri="http://schemas.microsoft.com/office/2006/metadata/properties"/>
+    <ds:schemaRef ds:uri="http://schemas.microsoft.com/office/infopath/2007/PartnerControls"/>
+    <ds:schemaRef ds:uri="71af3243-3dd4-4a8d-8c0d-dd76da1f02a5"/>
+  </ds:schemaRefs>
+</ds:datastoreItem>
 </file>
 
-<file path=customXml/itemProps1.xml><?xml version="1.0" encoding="utf-8"?>
+<file path=customXml/itemProps3.xml><?xml version="1.0" encoding="utf-8"?>
 <ds:datastoreItem xmlns:ds="http://schemas.openxmlformats.org/officeDocument/2006/customXml" ds:itemID="{0585E981-8C91-4205-A0C3-C991F42B4C9E}">
   <ds:schemaRefs>
     <ds:schemaRef ds:uri="http://schemas.microsoft.com/office/2006/metadata/contentType"/>
@@ -9840,22 +9877,4 @@
     <ds:schemaRef ds:uri="http://schemas.microsoft.com/internal/obd"/>
   </ds:schemaRefs>
 </ds:datastoreItem>
-</file>
-
-<file path=customXml/itemProps2.xml><?xml version="1.0" encoding="utf-8"?>
-<ds:datastoreItem xmlns:ds="http://schemas.openxmlformats.org/officeDocument/2006/customXml" ds:itemID="{2C4C00F4-06E9-43E3-AD97-88A857CEFA82}">
-  <ds:schemaRefs>
-    <ds:schemaRef ds:uri="http://schemas.microsoft.com/office/2006/metadata/properties"/>
-    <ds:schemaRef ds:uri="http://schemas.microsoft.com/office/infopath/2007/PartnerControls"/>
-    <ds:schemaRef ds:uri="71af3243-3dd4-4a8d-8c0d-dd76da1f02a5"/>
-  </ds:schemaRefs>
-</ds:datastoreItem>
-</file>
-
-<file path=customXml/itemProps3.xml><?xml version="1.0" encoding="utf-8"?>
-<ds:datastoreItem xmlns:ds="http://schemas.openxmlformats.org/officeDocument/2006/customXml" ds:itemID="{64B270AB-C138-415C-897E-3C24487DECF1}">
-  <ds:schemaRefs>
-    <ds:schemaRef ds:uri="http://schemas.microsoft.com/sharepoint/v3/contenttype/forms"/>
-  </ds:schemaRefs>
-</ds:datastoreItem>
 </file>
</xml_diff>